<commit_message>
Current Release Features - Include section changed
</commit_message>
<xml_diff>
--- a/Presentation.pptx
+++ b/Presentation.pptx
@@ -8788,7 +8788,7 @@
         <p:spPr>
           <a:xfrm>
             <a:off x="1109544" y="2025044"/>
-            <a:ext cx="2232248" cy="1415772"/>
+            <a:ext cx="2232248" cy="1738938"/>
           </a:xfrm>
           <a:prstGeom prst="rect">
             <a:avLst/>
@@ -8984,8 +8984,66 @@
                 <a:ea typeface="Tahoma" panose="020B0604030504040204" pitchFamily="34" charset="0"/>
                 <a:cs typeface="Tahoma" panose="020B0604030504040204" pitchFamily="34" charset="0"/>
               </a:rPr>
-              <a:t>Boundary conditions</a:t>
-            </a:r>
+              <a:t>Boundary </a:t>
+            </a:r>
+            <a:r>
+              <a:rPr lang="en-IN" sz="800" dirty="0" smtClean="0">
+                <a:solidFill>
+                  <a:schemeClr val="accent1">
+                    <a:lumMod val="75000"/>
+                  </a:schemeClr>
+                </a:solidFill>
+                <a:latin typeface="Tahoma" panose="020B0604030504040204" pitchFamily="34" charset="0"/>
+                <a:ea typeface="Tahoma" panose="020B0604030504040204" pitchFamily="34" charset="0"/>
+                <a:cs typeface="Tahoma" panose="020B0604030504040204" pitchFamily="34" charset="0"/>
+              </a:rPr>
+              <a:t>conditions</a:t>
+            </a:r>
+          </a:p>
+          <a:p>
+            <a:pPr marL="285750" indent="-285750">
+              <a:spcAft>
+                <a:spcPts val="600"/>
+              </a:spcAft>
+              <a:buFont typeface="Wingdings" panose="05000000000000000000" pitchFamily="2" charset="2"/>
+              <a:buChar char="Ø"/>
+            </a:pPr>
+            <a:r>
+              <a:rPr lang="en-IN" sz="800" dirty="0" smtClean="0">
+                <a:solidFill>
+                  <a:schemeClr val="accent1">
+                    <a:lumMod val="75000"/>
+                  </a:schemeClr>
+                </a:solidFill>
+                <a:latin typeface="Tahoma" panose="020B0604030504040204" pitchFamily="34" charset="0"/>
+                <a:ea typeface="Tahoma" panose="020B0604030504040204" pitchFamily="34" charset="0"/>
+                <a:cs typeface="Tahoma" panose="020B0604030504040204" pitchFamily="34" charset="0"/>
+              </a:rPr>
+              <a:t>Zero droop, Zero floor slope (</a:t>
+            </a:r>
+            <a:r>
+              <a:rPr lang="en-IN" sz="800" smtClean="0">
+                <a:solidFill>
+                  <a:schemeClr val="accent1">
+                    <a:lumMod val="75000"/>
+                  </a:schemeClr>
+                </a:solidFill>
+                <a:latin typeface="Tahoma" panose="020B0604030504040204" pitchFamily="34" charset="0"/>
+                <a:ea typeface="Tahoma" panose="020B0604030504040204" pitchFamily="34" charset="0"/>
+                <a:cs typeface="Tahoma" panose="020B0604030504040204" pitchFamily="34" charset="0"/>
+              </a:rPr>
+              <a:t>flat bottom) cases</a:t>
+            </a:r>
+            <a:endParaRPr lang="en-IN" sz="800" dirty="0" smtClean="0">
+              <a:solidFill>
+                <a:schemeClr val="accent1">
+                  <a:lumMod val="75000"/>
+                </a:schemeClr>
+              </a:solidFill>
+              <a:latin typeface="Tahoma" panose="020B0604030504040204" pitchFamily="34" charset="0"/>
+              <a:ea typeface="Tahoma" panose="020B0604030504040204" pitchFamily="34" charset="0"/>
+              <a:cs typeface="Tahoma" panose="020B0604030504040204" pitchFamily="34" charset="0"/>
+            </a:endParaRPr>
           </a:p>
         </p:txBody>
       </p:sp>
@@ -9854,41 +9912,23 @@
                                   </p:childTnLst>
                                 </p:cTn>
                               </p:par>
-                            </p:childTnLst>
-                          </p:cTn>
-                        </p:par>
-                      </p:childTnLst>
-                    </p:cTn>
-                  </p:par>
-                  <p:par>
-                    <p:cTn id="43" fill="hold">
-                      <p:stCondLst>
-                        <p:cond delay="indefinite"/>
-                      </p:stCondLst>
-                      <p:childTnLst>
-                        <p:par>
-                          <p:cTn id="44" fill="hold">
-                            <p:stCondLst>
-                              <p:cond delay="0"/>
-                            </p:stCondLst>
-                            <p:childTnLst>
                               <p:par>
-                                <p:cTn id="45" presetID="10" presetClass="entr" presetSubtype="0" fill="hold" grpId="0" nodeType="clickEffect">
+                                <p:cTn id="43" presetID="10" presetClass="entr" presetSubtype="0" fill="hold" grpId="0" nodeType="withEffect">
                                   <p:stCondLst>
                                     <p:cond delay="0"/>
                                   </p:stCondLst>
                                   <p:childTnLst>
                                     <p:set>
                                       <p:cBhvr>
-                                        <p:cTn id="46" dur="1" fill="hold">
+                                        <p:cTn id="44" dur="1" fill="hold">
                                           <p:stCondLst>
                                             <p:cond delay="0"/>
                                           </p:stCondLst>
                                         </p:cTn>
                                         <p:tgtEl>
-                                          <p:spTgt spid="22">
+                                          <p:spTgt spid="13">
                                             <p:txEl>
-                                              <p:pRg st="0" end="0"/>
+                                              <p:pRg st="7" end="7"/>
                                             </p:txEl>
                                           </p:spTgt>
                                         </p:tgtEl>
@@ -9902,11 +9942,11 @@
                                     </p:set>
                                     <p:animEffect transition="in" filter="fade">
                                       <p:cBhvr>
-                                        <p:cTn id="47" dur="500"/>
-                                        <p:tgtEl>
-                                          <p:spTgt spid="22">
+                                        <p:cTn id="45" dur="500"/>
+                                        <p:tgtEl>
+                                          <p:spTgt spid="13">
                                             <p:txEl>
-                                              <p:pRg st="0" end="0"/>
+                                              <p:pRg st="7" end="7"/>
                                             </p:txEl>
                                           </p:spTgt>
                                         </p:tgtEl>
@@ -9922,32 +9962,32 @@
                     </p:cTn>
                   </p:par>
                   <p:par>
-                    <p:cTn id="48" fill="hold">
+                    <p:cTn id="46" fill="hold">
                       <p:stCondLst>
                         <p:cond delay="indefinite"/>
                       </p:stCondLst>
                       <p:childTnLst>
                         <p:par>
-                          <p:cTn id="49" fill="hold">
+                          <p:cTn id="47" fill="hold">
                             <p:stCondLst>
                               <p:cond delay="0"/>
                             </p:stCondLst>
                             <p:childTnLst>
                               <p:par>
-                                <p:cTn id="50" presetID="10" presetClass="entr" presetSubtype="0" fill="hold" grpId="0" nodeType="clickEffect">
+                                <p:cTn id="48" presetID="10" presetClass="entr" presetSubtype="0" fill="hold" grpId="0" nodeType="clickEffect">
                                   <p:stCondLst>
                                     <p:cond delay="0"/>
                                   </p:stCondLst>
                                   <p:childTnLst>
                                     <p:set>
                                       <p:cBhvr>
-                                        <p:cTn id="51" dur="1" fill="hold">
+                                        <p:cTn id="49" dur="1" fill="hold">
                                           <p:stCondLst>
                                             <p:cond delay="0"/>
                                           </p:stCondLst>
                                         </p:cTn>
                                         <p:tgtEl>
-                                          <p:spTgt spid="17">
+                                          <p:spTgt spid="22">
                                             <p:txEl>
                                               <p:pRg st="0" end="0"/>
                                             </p:txEl>
@@ -9963,9 +10003,9 @@
                                     </p:set>
                                     <p:animEffect transition="in" filter="fade">
                                       <p:cBhvr>
-                                        <p:cTn id="52" dur="500"/>
-                                        <p:tgtEl>
-                                          <p:spTgt spid="17">
+                                        <p:cTn id="50" dur="500"/>
+                                        <p:tgtEl>
+                                          <p:spTgt spid="22">
                                             <p:txEl>
                                               <p:pRg st="0" end="0"/>
                                             </p:txEl>
@@ -9983,26 +10023,26 @@
                     </p:cTn>
                   </p:par>
                   <p:par>
-                    <p:cTn id="53" fill="hold">
+                    <p:cTn id="51" fill="hold">
                       <p:stCondLst>
                         <p:cond delay="indefinite"/>
                       </p:stCondLst>
                       <p:childTnLst>
                         <p:par>
-                          <p:cTn id="54" fill="hold">
+                          <p:cTn id="52" fill="hold">
                             <p:stCondLst>
                               <p:cond delay="0"/>
                             </p:stCondLst>
                             <p:childTnLst>
                               <p:par>
-                                <p:cTn id="55" presetID="10" presetClass="entr" presetSubtype="0" fill="hold" grpId="0" nodeType="clickEffect">
+                                <p:cTn id="53" presetID="10" presetClass="entr" presetSubtype="0" fill="hold" grpId="0" nodeType="clickEffect">
                                   <p:stCondLst>
                                     <p:cond delay="0"/>
                                   </p:stCondLst>
                                   <p:childTnLst>
                                     <p:set>
                                       <p:cBhvr>
-                                        <p:cTn id="56" dur="1" fill="hold">
+                                        <p:cTn id="54" dur="1" fill="hold">
                                           <p:stCondLst>
                                             <p:cond delay="0"/>
                                           </p:stCondLst>
@@ -10010,7 +10050,7 @@
                                         <p:tgtEl>
                                           <p:spTgt spid="17">
                                             <p:txEl>
-                                              <p:pRg st="1" end="1"/>
+                                              <p:pRg st="0" end="0"/>
                                             </p:txEl>
                                           </p:spTgt>
                                         </p:tgtEl>
@@ -10024,11 +10064,11 @@
                                     </p:set>
                                     <p:animEffect transition="in" filter="fade">
                                       <p:cBhvr>
-                                        <p:cTn id="57" dur="500"/>
+                                        <p:cTn id="55" dur="500"/>
                                         <p:tgtEl>
                                           <p:spTgt spid="17">
                                             <p:txEl>
-                                              <p:pRg st="1" end="1"/>
+                                              <p:pRg st="0" end="0"/>
                                             </p:txEl>
                                           </p:spTgt>
                                         </p:tgtEl>
@@ -10044,26 +10084,26 @@
                     </p:cTn>
                   </p:par>
                   <p:par>
-                    <p:cTn id="58" fill="hold">
+                    <p:cTn id="56" fill="hold">
                       <p:stCondLst>
                         <p:cond delay="indefinite"/>
                       </p:stCondLst>
                       <p:childTnLst>
                         <p:par>
-                          <p:cTn id="59" fill="hold">
+                          <p:cTn id="57" fill="hold">
                             <p:stCondLst>
                               <p:cond delay="0"/>
                             </p:stCondLst>
                             <p:childTnLst>
                               <p:par>
-                                <p:cTn id="60" presetID="10" presetClass="entr" presetSubtype="0" fill="hold" grpId="0" nodeType="clickEffect">
+                                <p:cTn id="58" presetID="10" presetClass="entr" presetSubtype="0" fill="hold" grpId="0" nodeType="clickEffect">
                                   <p:stCondLst>
                                     <p:cond delay="0"/>
                                   </p:stCondLst>
                                   <p:childTnLst>
                                     <p:set>
                                       <p:cBhvr>
-                                        <p:cTn id="61" dur="1" fill="hold">
+                                        <p:cTn id="59" dur="1" fill="hold">
                                           <p:stCondLst>
                                             <p:cond delay="0"/>
                                           </p:stCondLst>
@@ -10071,7 +10111,7 @@
                                         <p:tgtEl>
                                           <p:spTgt spid="17">
                                             <p:txEl>
-                                              <p:pRg st="2" end="2"/>
+                                              <p:pRg st="1" end="1"/>
                                             </p:txEl>
                                           </p:spTgt>
                                         </p:tgtEl>
@@ -10085,11 +10125,11 @@
                                     </p:set>
                                     <p:animEffect transition="in" filter="fade">
                                       <p:cBhvr>
-                                        <p:cTn id="62" dur="500"/>
+                                        <p:cTn id="60" dur="500"/>
                                         <p:tgtEl>
                                           <p:spTgt spid="17">
                                             <p:txEl>
-                                              <p:pRg st="2" end="2"/>
+                                              <p:pRg st="1" end="1"/>
                                             </p:txEl>
                                           </p:spTgt>
                                         </p:tgtEl>
@@ -10105,26 +10145,26 @@
                     </p:cTn>
                   </p:par>
                   <p:par>
-                    <p:cTn id="63" fill="hold">
+                    <p:cTn id="61" fill="hold">
                       <p:stCondLst>
                         <p:cond delay="indefinite"/>
                       </p:stCondLst>
                       <p:childTnLst>
                         <p:par>
-                          <p:cTn id="64" fill="hold">
+                          <p:cTn id="62" fill="hold">
                             <p:stCondLst>
                               <p:cond delay="0"/>
                             </p:stCondLst>
                             <p:childTnLst>
                               <p:par>
-                                <p:cTn id="65" presetID="10" presetClass="entr" presetSubtype="0" fill="hold" grpId="0" nodeType="clickEffect">
+                                <p:cTn id="63" presetID="10" presetClass="entr" presetSubtype="0" fill="hold" grpId="0" nodeType="clickEffect">
                                   <p:stCondLst>
                                     <p:cond delay="0"/>
                                   </p:stCondLst>
                                   <p:childTnLst>
                                     <p:set>
                                       <p:cBhvr>
-                                        <p:cTn id="66" dur="1" fill="hold">
+                                        <p:cTn id="64" dur="1" fill="hold">
                                           <p:stCondLst>
                                             <p:cond delay="0"/>
                                           </p:stCondLst>
@@ -10132,7 +10172,7 @@
                                         <p:tgtEl>
                                           <p:spTgt spid="17">
                                             <p:txEl>
-                                              <p:pRg st="3" end="3"/>
+                                              <p:pRg st="2" end="2"/>
                                             </p:txEl>
                                           </p:spTgt>
                                         </p:tgtEl>
@@ -10146,11 +10186,11 @@
                                     </p:set>
                                     <p:animEffect transition="in" filter="fade">
                                       <p:cBhvr>
-                                        <p:cTn id="67" dur="500"/>
+                                        <p:cTn id="65" dur="500"/>
                                         <p:tgtEl>
                                           <p:spTgt spid="17">
                                             <p:txEl>
-                                              <p:pRg st="3" end="3"/>
+                                              <p:pRg st="2" end="2"/>
                                             </p:txEl>
                                           </p:spTgt>
                                         </p:tgtEl>
@@ -10166,26 +10206,26 @@
                     </p:cTn>
                   </p:par>
                   <p:par>
-                    <p:cTn id="68" fill="hold">
+                    <p:cTn id="66" fill="hold">
                       <p:stCondLst>
                         <p:cond delay="indefinite"/>
                       </p:stCondLst>
                       <p:childTnLst>
                         <p:par>
-                          <p:cTn id="69" fill="hold">
+                          <p:cTn id="67" fill="hold">
                             <p:stCondLst>
                               <p:cond delay="0"/>
                             </p:stCondLst>
                             <p:childTnLst>
                               <p:par>
-                                <p:cTn id="70" presetID="10" presetClass="entr" presetSubtype="0" fill="hold" grpId="0" nodeType="clickEffect">
+                                <p:cTn id="68" presetID="10" presetClass="entr" presetSubtype="0" fill="hold" grpId="0" nodeType="clickEffect">
                                   <p:stCondLst>
                                     <p:cond delay="0"/>
                                   </p:stCondLst>
                                   <p:childTnLst>
                                     <p:set>
                                       <p:cBhvr>
-                                        <p:cTn id="71" dur="1" fill="hold">
+                                        <p:cTn id="69" dur="1" fill="hold">
                                           <p:stCondLst>
                                             <p:cond delay="0"/>
                                           </p:stCondLst>
@@ -10193,7 +10233,7 @@
                                         <p:tgtEl>
                                           <p:spTgt spid="17">
                                             <p:txEl>
-                                              <p:pRg st="4" end="4"/>
+                                              <p:pRg st="3" end="3"/>
                                             </p:txEl>
                                           </p:spTgt>
                                         </p:tgtEl>
@@ -10207,11 +10247,11 @@
                                     </p:set>
                                     <p:animEffect transition="in" filter="fade">
                                       <p:cBhvr>
-                                        <p:cTn id="72" dur="500"/>
+                                        <p:cTn id="70" dur="500"/>
                                         <p:tgtEl>
                                           <p:spTgt spid="17">
                                             <p:txEl>
-                                              <p:pRg st="4" end="4"/>
+                                              <p:pRg st="3" end="3"/>
                                             </p:txEl>
                                           </p:spTgt>
                                         </p:tgtEl>
@@ -10227,26 +10267,26 @@
                     </p:cTn>
                   </p:par>
                   <p:par>
-                    <p:cTn id="73" fill="hold">
+                    <p:cTn id="71" fill="hold">
                       <p:stCondLst>
                         <p:cond delay="indefinite"/>
                       </p:stCondLst>
                       <p:childTnLst>
                         <p:par>
-                          <p:cTn id="74" fill="hold">
+                          <p:cTn id="72" fill="hold">
                             <p:stCondLst>
                               <p:cond delay="0"/>
                             </p:stCondLst>
                             <p:childTnLst>
                               <p:par>
-                                <p:cTn id="75" presetID="10" presetClass="entr" presetSubtype="0" fill="hold" grpId="0" nodeType="clickEffect">
+                                <p:cTn id="73" presetID="10" presetClass="entr" presetSubtype="0" fill="hold" grpId="0" nodeType="clickEffect">
                                   <p:stCondLst>
                                     <p:cond delay="0"/>
                                   </p:stCondLst>
                                   <p:childTnLst>
                                     <p:set>
                                       <p:cBhvr>
-                                        <p:cTn id="76" dur="1" fill="hold">
+                                        <p:cTn id="74" dur="1" fill="hold">
                                           <p:stCondLst>
                                             <p:cond delay="0"/>
                                           </p:stCondLst>
@@ -10254,7 +10294,7 @@
                                         <p:tgtEl>
                                           <p:spTgt spid="17">
                                             <p:txEl>
-                                              <p:pRg st="5" end="5"/>
+                                              <p:pRg st="4" end="4"/>
                                             </p:txEl>
                                           </p:spTgt>
                                         </p:tgtEl>
@@ -10268,11 +10308,11 @@
                                     </p:set>
                                     <p:animEffect transition="in" filter="fade">
                                       <p:cBhvr>
-                                        <p:cTn id="77" dur="500"/>
+                                        <p:cTn id="75" dur="500"/>
                                         <p:tgtEl>
                                           <p:spTgt spid="17">
                                             <p:txEl>
-                                              <p:pRg st="5" end="5"/>
+                                              <p:pRg st="4" end="4"/>
                                             </p:txEl>
                                           </p:spTgt>
                                         </p:tgtEl>
@@ -10288,26 +10328,26 @@
                     </p:cTn>
                   </p:par>
                   <p:par>
-                    <p:cTn id="78" fill="hold">
+                    <p:cTn id="76" fill="hold">
                       <p:stCondLst>
                         <p:cond delay="indefinite"/>
                       </p:stCondLst>
                       <p:childTnLst>
                         <p:par>
-                          <p:cTn id="79" fill="hold">
+                          <p:cTn id="77" fill="hold">
                             <p:stCondLst>
                               <p:cond delay="0"/>
                             </p:stCondLst>
                             <p:childTnLst>
                               <p:par>
-                                <p:cTn id="80" presetID="10" presetClass="entr" presetSubtype="0" fill="hold" grpId="0" nodeType="clickEffect">
+                                <p:cTn id="78" presetID="10" presetClass="entr" presetSubtype="0" fill="hold" grpId="0" nodeType="clickEffect">
                                   <p:stCondLst>
                                     <p:cond delay="0"/>
                                   </p:stCondLst>
                                   <p:childTnLst>
                                     <p:set>
                                       <p:cBhvr>
-                                        <p:cTn id="81" dur="1" fill="hold">
+                                        <p:cTn id="79" dur="1" fill="hold">
                                           <p:stCondLst>
                                             <p:cond delay="0"/>
                                           </p:stCondLst>
@@ -10315,7 +10355,7 @@
                                         <p:tgtEl>
                                           <p:spTgt spid="17">
                                             <p:txEl>
-                                              <p:pRg st="6" end="6"/>
+                                              <p:pRg st="5" end="5"/>
                                             </p:txEl>
                                           </p:spTgt>
                                         </p:tgtEl>
@@ -10329,11 +10369,11 @@
                                     </p:set>
                                     <p:animEffect transition="in" filter="fade">
                                       <p:cBhvr>
-                                        <p:cTn id="82" dur="500"/>
+                                        <p:cTn id="80" dur="500"/>
                                         <p:tgtEl>
                                           <p:spTgt spid="17">
                                             <p:txEl>
-                                              <p:pRg st="6" end="6"/>
+                                              <p:pRg st="5" end="5"/>
                                             </p:txEl>
                                           </p:spTgt>
                                         </p:tgtEl>
@@ -10349,26 +10389,26 @@
                     </p:cTn>
                   </p:par>
                   <p:par>
-                    <p:cTn id="83" fill="hold">
+                    <p:cTn id="81" fill="hold">
                       <p:stCondLst>
                         <p:cond delay="indefinite"/>
                       </p:stCondLst>
                       <p:childTnLst>
                         <p:par>
-                          <p:cTn id="84" fill="hold">
+                          <p:cTn id="82" fill="hold">
                             <p:stCondLst>
                               <p:cond delay="0"/>
                             </p:stCondLst>
                             <p:childTnLst>
                               <p:par>
-                                <p:cTn id="85" presetID="10" presetClass="entr" presetSubtype="0" fill="hold" grpId="0" nodeType="clickEffect">
+                                <p:cTn id="83" presetID="10" presetClass="entr" presetSubtype="0" fill="hold" grpId="0" nodeType="clickEffect">
                                   <p:stCondLst>
                                     <p:cond delay="0"/>
                                   </p:stCondLst>
                                   <p:childTnLst>
                                     <p:set>
                                       <p:cBhvr>
-                                        <p:cTn id="86" dur="1" fill="hold">
+                                        <p:cTn id="84" dur="1" fill="hold">
                                           <p:stCondLst>
                                             <p:cond delay="0"/>
                                           </p:stCondLst>
@@ -10376,7 +10416,7 @@
                                         <p:tgtEl>
                                           <p:spTgt spid="17">
                                             <p:txEl>
-                                              <p:pRg st="7" end="7"/>
+                                              <p:pRg st="6" end="6"/>
                                             </p:txEl>
                                           </p:spTgt>
                                         </p:tgtEl>
@@ -10390,11 +10430,11 @@
                                     </p:set>
                                     <p:animEffect transition="in" filter="fade">
                                       <p:cBhvr>
-                                        <p:cTn id="87" dur="500"/>
+                                        <p:cTn id="85" dur="500"/>
                                         <p:tgtEl>
                                           <p:spTgt spid="17">
                                             <p:txEl>
-                                              <p:pRg st="7" end="7"/>
+                                              <p:pRg st="6" end="6"/>
                                             </p:txEl>
                                           </p:spTgt>
                                         </p:tgtEl>
@@ -10410,26 +10450,87 @@
                     </p:cTn>
                   </p:par>
                   <p:par>
-                    <p:cTn id="88" fill="hold">
+                    <p:cTn id="86" fill="hold">
                       <p:stCondLst>
                         <p:cond delay="indefinite"/>
                       </p:stCondLst>
                       <p:childTnLst>
                         <p:par>
-                          <p:cTn id="89" fill="hold">
+                          <p:cTn id="87" fill="hold">
                             <p:stCondLst>
                               <p:cond delay="0"/>
                             </p:stCondLst>
                             <p:childTnLst>
                               <p:par>
-                                <p:cTn id="90" presetID="10" presetClass="entr" presetSubtype="0" fill="hold" grpId="0" nodeType="clickEffect">
+                                <p:cTn id="88" presetID="10" presetClass="entr" presetSubtype="0" fill="hold" grpId="0" nodeType="clickEffect">
                                   <p:stCondLst>
                                     <p:cond delay="0"/>
                                   </p:stCondLst>
                                   <p:childTnLst>
                                     <p:set>
                                       <p:cBhvr>
-                                        <p:cTn id="91" dur="1" fill="hold">
+                                        <p:cTn id="89" dur="1" fill="hold">
+                                          <p:stCondLst>
+                                            <p:cond delay="0"/>
+                                          </p:stCondLst>
+                                        </p:cTn>
+                                        <p:tgtEl>
+                                          <p:spTgt spid="17">
+                                            <p:txEl>
+                                              <p:pRg st="7" end="7"/>
+                                            </p:txEl>
+                                          </p:spTgt>
+                                        </p:tgtEl>
+                                        <p:attrNameLst>
+                                          <p:attrName>style.visibility</p:attrName>
+                                        </p:attrNameLst>
+                                      </p:cBhvr>
+                                      <p:to>
+                                        <p:strVal val="visible"/>
+                                      </p:to>
+                                    </p:set>
+                                    <p:animEffect transition="in" filter="fade">
+                                      <p:cBhvr>
+                                        <p:cTn id="90" dur="500"/>
+                                        <p:tgtEl>
+                                          <p:spTgt spid="17">
+                                            <p:txEl>
+                                              <p:pRg st="7" end="7"/>
+                                            </p:txEl>
+                                          </p:spTgt>
+                                        </p:tgtEl>
+                                      </p:cBhvr>
+                                    </p:animEffect>
+                                  </p:childTnLst>
+                                </p:cTn>
+                              </p:par>
+                            </p:childTnLst>
+                          </p:cTn>
+                        </p:par>
+                      </p:childTnLst>
+                    </p:cTn>
+                  </p:par>
+                  <p:par>
+                    <p:cTn id="91" fill="hold">
+                      <p:stCondLst>
+                        <p:cond delay="indefinite"/>
+                      </p:stCondLst>
+                      <p:childTnLst>
+                        <p:par>
+                          <p:cTn id="92" fill="hold">
+                            <p:stCondLst>
+                              <p:cond delay="0"/>
+                            </p:stCondLst>
+                            <p:childTnLst>
+                              <p:par>
+                                <p:cTn id="93" presetID="10" presetClass="entr" presetSubtype="0" fill="hold" grpId="0" nodeType="clickEffect">
+                                  <p:stCondLst>
+                                    <p:cond delay="0"/>
+                                  </p:stCondLst>
+                                  <p:childTnLst>
+                                    <p:set>
+                                      <p:cBhvr>
+                                        <p:cTn id="94" dur="1" fill="hold">
                                           <p:stCondLst>
                                             <p:cond delay="0"/>
                                           </p:stCondLst>
@@ -10451,7 +10552,7 @@
                                     </p:set>
                                     <p:animEffect transition="in" filter="fade">
                                       <p:cBhvr>
-                                        <p:cTn id="92" dur="500"/>
+                                        <p:cTn id="95" dur="500"/>
                                         <p:tgtEl>
                                           <p:spTgt spid="17">
                                             <p:txEl>

</xml_diff>